<commit_message>
added the open source data sheets
</commit_message>
<xml_diff>
--- a/documents/UMLx_Introduction_analysis.pptx
+++ b/documents/UMLx_Introduction_analysis.pptx
@@ -217,7 +217,7 @@
           <a:p>
             <a:fld id="{1AA9BCBD-F247-43A9-8490-88C651420C90}" type="datetimeFigureOut">
               <a:rPr lang="en-US" smtClean="0"/>
-              <a:t>5/21/2018</a:t>
+              <a:t>10/19/2018</a:t>
             </a:fld>
             <a:endParaRPr lang="en-US"/>
           </a:p>
@@ -700,7 +700,7 @@
           <a:p>
             <a:fld id="{9D00D9CD-F0CF-44B7-B550-D9BAB2022B28}" type="datetimeFigureOut">
               <a:rPr lang="en-US" smtClean="0"/>
-              <a:t>5/21/2018</a:t>
+              <a:t>10/19/2018</a:t>
             </a:fld>
             <a:endParaRPr lang="en-US"/>
           </a:p>
@@ -870,7 +870,7 @@
           <a:p>
             <a:fld id="{9D00D9CD-F0CF-44B7-B550-D9BAB2022B28}" type="datetimeFigureOut">
               <a:rPr lang="en-US" smtClean="0"/>
-              <a:t>5/21/2018</a:t>
+              <a:t>10/19/2018</a:t>
             </a:fld>
             <a:endParaRPr lang="en-US"/>
           </a:p>
@@ -1050,7 +1050,7 @@
           <a:p>
             <a:fld id="{9D00D9CD-F0CF-44B7-B550-D9BAB2022B28}" type="datetimeFigureOut">
               <a:rPr lang="en-US" smtClean="0"/>
-              <a:t>5/21/2018</a:t>
+              <a:t>10/19/2018</a:t>
             </a:fld>
             <a:endParaRPr lang="en-US"/>
           </a:p>
@@ -1220,7 +1220,7 @@
           <a:p>
             <a:fld id="{9D00D9CD-F0CF-44B7-B550-D9BAB2022B28}" type="datetimeFigureOut">
               <a:rPr lang="en-US" smtClean="0"/>
-              <a:t>5/21/2018</a:t>
+              <a:t>10/19/2018</a:t>
             </a:fld>
             <a:endParaRPr lang="en-US"/>
           </a:p>
@@ -1466,7 +1466,7 @@
           <a:p>
             <a:fld id="{9D00D9CD-F0CF-44B7-B550-D9BAB2022B28}" type="datetimeFigureOut">
               <a:rPr lang="en-US" smtClean="0"/>
-              <a:t>5/21/2018</a:t>
+              <a:t>10/19/2018</a:t>
             </a:fld>
             <a:endParaRPr lang="en-US"/>
           </a:p>
@@ -1698,7 +1698,7 @@
           <a:p>
             <a:fld id="{9D00D9CD-F0CF-44B7-B550-D9BAB2022B28}" type="datetimeFigureOut">
               <a:rPr lang="en-US" smtClean="0"/>
-              <a:t>5/21/2018</a:t>
+              <a:t>10/19/2018</a:t>
             </a:fld>
             <a:endParaRPr lang="en-US"/>
           </a:p>
@@ -2065,7 +2065,7 @@
           <a:p>
             <a:fld id="{9D00D9CD-F0CF-44B7-B550-D9BAB2022B28}" type="datetimeFigureOut">
               <a:rPr lang="en-US" smtClean="0"/>
-              <a:t>5/21/2018</a:t>
+              <a:t>10/19/2018</a:t>
             </a:fld>
             <a:endParaRPr lang="en-US"/>
           </a:p>
@@ -2183,7 +2183,7 @@
           <a:p>
             <a:fld id="{9D00D9CD-F0CF-44B7-B550-D9BAB2022B28}" type="datetimeFigureOut">
               <a:rPr lang="en-US" smtClean="0"/>
-              <a:t>5/21/2018</a:t>
+              <a:t>10/19/2018</a:t>
             </a:fld>
             <a:endParaRPr lang="en-US"/>
           </a:p>
@@ -2278,7 +2278,7 @@
           <a:p>
             <a:fld id="{9D00D9CD-F0CF-44B7-B550-D9BAB2022B28}" type="datetimeFigureOut">
               <a:rPr lang="en-US" smtClean="0"/>
-              <a:t>5/21/2018</a:t>
+              <a:t>10/19/2018</a:t>
             </a:fld>
             <a:endParaRPr lang="en-US"/>
           </a:p>
@@ -2555,7 +2555,7 @@
           <a:p>
             <a:fld id="{9D00D9CD-F0CF-44B7-B550-D9BAB2022B28}" type="datetimeFigureOut">
               <a:rPr lang="en-US" smtClean="0"/>
-              <a:t>5/21/2018</a:t>
+              <a:t>10/19/2018</a:t>
             </a:fld>
             <a:endParaRPr lang="en-US"/>
           </a:p>
@@ -2808,7 +2808,7 @@
           <a:p>
             <a:fld id="{9D00D9CD-F0CF-44B7-B550-D9BAB2022B28}" type="datetimeFigureOut">
               <a:rPr lang="en-US" smtClean="0"/>
-              <a:t>5/21/2018</a:t>
+              <a:t>10/19/2018</a:t>
             </a:fld>
             <a:endParaRPr lang="en-US"/>
           </a:p>
@@ -3021,7 +3021,7 @@
           <a:p>
             <a:fld id="{9D00D9CD-F0CF-44B7-B550-D9BAB2022B28}" type="datetimeFigureOut">
               <a:rPr lang="en-US" smtClean="0"/>
-              <a:t>5/21/2018</a:t>
+              <a:t>10/19/2018</a:t>
             </a:fld>
             <a:endParaRPr lang="en-US"/>
           </a:p>
@@ -5500,7 +5500,7 @@
         </p:blipFill>
         <p:spPr>
           <a:xfrm>
-            <a:off x="3672056" y="1419084"/>
+            <a:off x="3672056" y="1428320"/>
             <a:ext cx="7681744" cy="3071435"/>
           </a:xfrm>
         </p:spPr>

</xml_diff>